<commit_message>
Added One New Slide
</commit_message>
<xml_diff>
--- a/Test PPT.pptx
+++ b/Test PPT.pptx
@@ -7,6 +7,7 @@
   </p:sldMasterIdLst>
   <p:sldIdLst>
     <p:sldId id="275" r:id="rId3"/>
+    <p:sldId id="276" r:id="rId4"/>
   </p:sldIdLst>
   <p:sldSz cx="10080625" cy="7559675"/>
   <p:notesSz cx="7772400" cy="10058400"/>
@@ -5017,6 +5018,337 @@
     <p:extLst>
       <p:ext uri="{BB962C8B-B14F-4D97-AF65-F5344CB8AC3E}">
         <p14:creationId xmlns:p14="http://schemas.microsoft.com/office/powerpoint/2010/main" val="1212233363"/>
+      </p:ext>
+    </p:extLst>
+  </p:cSld>
+  <p:clrMapOvr>
+    <a:masterClrMapping/>
+  </p:clrMapOvr>
+  <p:timing>
+    <p:tnLst>
+      <p:par>
+        <p:cTn id="1" dur="indefinite" restart="never" nodeType="tmRoot"/>
+      </p:par>
+    </p:tnLst>
+  </p:timing>
+</p:sld>
+</file>
+
+<file path=ppt/slides/slide2.xml><?xml version="1.0" encoding="utf-8"?>
+<p:sld xmlns:a="http://schemas.openxmlformats.org/drawingml/2006/main" xmlns:r="http://schemas.openxmlformats.org/officeDocument/2006/relationships" xmlns:p="http://schemas.openxmlformats.org/presentationml/2006/main">
+  <p:cSld>
+    <p:spTree>
+      <p:nvGrpSpPr>
+        <p:cNvPr id="1" name=""/>
+        <p:cNvGrpSpPr/>
+        <p:nvPr/>
+      </p:nvGrpSpPr>
+      <p:grpSpPr>
+        <a:xfrm>
+          <a:off x="0" y="0"/>
+          <a:ext cx="0" cy="0"/>
+          <a:chOff x="0" y="0"/>
+          <a:chExt cx="0" cy="0"/>
+        </a:xfrm>
+      </p:grpSpPr>
+      <p:sp>
+        <p:nvSpPr>
+          <p:cNvPr id="2" name="Text Placeholder 1"/>
+          <p:cNvSpPr>
+            <a:spLocks noGrp="1"/>
+          </p:cNvSpPr>
+          <p:nvPr>
+            <p:ph type="body"/>
+          </p:nvPr>
+        </p:nvSpPr>
+        <p:spPr>
+          <a:xfrm>
+            <a:off x="504000" y="1043533"/>
+            <a:ext cx="9071640" cy="6192687"/>
+          </a:xfrm>
+        </p:spPr>
+        <p:txBody>
+          <a:bodyPr>
+            <a:noAutofit/>
+          </a:bodyPr>
+          <a:lstStyle/>
+          <a:p>
+            <a:endParaRPr lang="en-US" sz="1700" dirty="0" smtClean="0">
+              <a:latin typeface="Times New Roman" panose="02020603050405020304" pitchFamily="18" charset="0"/>
+              <a:cs typeface="Times New Roman" panose="02020603050405020304" pitchFamily="18" charset="0"/>
+            </a:endParaRPr>
+          </a:p>
+          <a:p>
+            <a:r>
+              <a:rPr lang="en-US" sz="1700" b="1" dirty="0" smtClean="0">
+                <a:latin typeface="Times New Roman" panose="02020603050405020304" pitchFamily="18" charset="0"/>
+                <a:cs typeface="Times New Roman" panose="02020603050405020304" pitchFamily="18" charset="0"/>
+              </a:rPr>
+              <a:t>Project </a:t>
+            </a:r>
+            <a:r>
+              <a:rPr lang="en-US" sz="1700" b="1" dirty="0">
+                <a:latin typeface="Times New Roman" panose="02020603050405020304" pitchFamily="18" charset="0"/>
+                <a:cs typeface="Times New Roman" panose="02020603050405020304" pitchFamily="18" charset="0"/>
+              </a:rPr>
+              <a:t>management processes fall into five groups</a:t>
+            </a:r>
+            <a:r>
+              <a:rPr lang="en-US" sz="1700" b="1" dirty="0" smtClean="0">
+                <a:latin typeface="Times New Roman" panose="02020603050405020304" pitchFamily="18" charset="0"/>
+                <a:cs typeface="Times New Roman" panose="02020603050405020304" pitchFamily="18" charset="0"/>
+              </a:rPr>
+              <a:t>:</a:t>
+            </a:r>
+          </a:p>
+          <a:p>
+            <a:endParaRPr lang="en-US" sz="1700" dirty="0">
+              <a:latin typeface="Times New Roman" panose="02020603050405020304" pitchFamily="18" charset="0"/>
+              <a:cs typeface="Times New Roman" panose="02020603050405020304" pitchFamily="18" charset="0"/>
+            </a:endParaRPr>
+          </a:p>
+          <a:p>
+            <a:pPr marL="285750" indent="-285750">
+              <a:buFont typeface="Arial" panose="020B0604020202020204" pitchFamily="34" charset="0"/>
+              <a:buChar char="•"/>
+            </a:pPr>
+            <a:r>
+              <a:rPr lang="en-US" sz="1700" dirty="0" smtClean="0">
+                <a:latin typeface="Times New Roman" panose="02020603050405020304" pitchFamily="18" charset="0"/>
+                <a:cs typeface="Times New Roman" panose="02020603050405020304" pitchFamily="18" charset="0"/>
+              </a:rPr>
+              <a:t>Initiating</a:t>
+            </a:r>
+            <a:endParaRPr lang="en-US" sz="1700" dirty="0">
+              <a:latin typeface="Times New Roman" panose="02020603050405020304" pitchFamily="18" charset="0"/>
+              <a:cs typeface="Times New Roman" panose="02020603050405020304" pitchFamily="18" charset="0"/>
+            </a:endParaRPr>
+          </a:p>
+          <a:p>
+            <a:pPr marL="285750" indent="-285750">
+              <a:buFont typeface="Arial" panose="020B0604020202020204" pitchFamily="34" charset="0"/>
+              <a:buChar char="•"/>
+            </a:pPr>
+            <a:r>
+              <a:rPr lang="en-US" sz="1700" dirty="0">
+                <a:latin typeface="Times New Roman" panose="02020603050405020304" pitchFamily="18" charset="0"/>
+                <a:cs typeface="Times New Roman" panose="02020603050405020304" pitchFamily="18" charset="0"/>
+              </a:rPr>
+              <a:t>Planning</a:t>
+            </a:r>
+          </a:p>
+          <a:p>
+            <a:pPr marL="285750" indent="-285750">
+              <a:buFont typeface="Arial" panose="020B0604020202020204" pitchFamily="34" charset="0"/>
+              <a:buChar char="•"/>
+            </a:pPr>
+            <a:r>
+              <a:rPr lang="en-US" sz="1700" dirty="0">
+                <a:latin typeface="Times New Roman" panose="02020603050405020304" pitchFamily="18" charset="0"/>
+                <a:cs typeface="Times New Roman" panose="02020603050405020304" pitchFamily="18" charset="0"/>
+              </a:rPr>
+              <a:t>Executing</a:t>
+            </a:r>
+          </a:p>
+          <a:p>
+            <a:pPr marL="285750" indent="-285750">
+              <a:buFont typeface="Arial" panose="020B0604020202020204" pitchFamily="34" charset="0"/>
+              <a:buChar char="•"/>
+            </a:pPr>
+            <a:r>
+              <a:rPr lang="en-US" sz="1700" dirty="0">
+                <a:latin typeface="Times New Roman" panose="02020603050405020304" pitchFamily="18" charset="0"/>
+                <a:cs typeface="Times New Roman" panose="02020603050405020304" pitchFamily="18" charset="0"/>
+              </a:rPr>
+              <a:t>Monitoring and Controlling</a:t>
+            </a:r>
+          </a:p>
+          <a:p>
+            <a:pPr marL="285750" indent="-285750">
+              <a:buFont typeface="Arial" panose="020B0604020202020204" pitchFamily="34" charset="0"/>
+              <a:buChar char="•"/>
+            </a:pPr>
+            <a:r>
+              <a:rPr lang="en-US" sz="1700" dirty="0" smtClean="0">
+                <a:latin typeface="Times New Roman" panose="02020603050405020304" pitchFamily="18" charset="0"/>
+                <a:cs typeface="Times New Roman" panose="02020603050405020304" pitchFamily="18" charset="0"/>
+              </a:rPr>
+              <a:t>Closing</a:t>
+            </a:r>
+          </a:p>
+          <a:p>
+            <a:pPr marL="285750" indent="-285750">
+              <a:buFont typeface="Arial" panose="020B0604020202020204" pitchFamily="34" charset="0"/>
+              <a:buChar char="•"/>
+            </a:pPr>
+            <a:endParaRPr lang="en-US" sz="1700" dirty="0">
+              <a:latin typeface="Times New Roman" panose="02020603050405020304" pitchFamily="18" charset="0"/>
+              <a:cs typeface="Times New Roman" panose="02020603050405020304" pitchFamily="18" charset="0"/>
+            </a:endParaRPr>
+          </a:p>
+          <a:p>
+            <a:r>
+              <a:rPr lang="en-US" sz="1700" b="1" dirty="0"/>
+              <a:t>Project management knowledge draws on ten areas</a:t>
+            </a:r>
+            <a:r>
+              <a:rPr lang="en-US" sz="1700" b="1" dirty="0" smtClean="0"/>
+              <a:t>:</a:t>
+            </a:r>
+            <a:endParaRPr lang="en-US" sz="1700" dirty="0" smtClean="0"/>
+          </a:p>
+          <a:p>
+            <a:endParaRPr lang="en-US" sz="1700" dirty="0"/>
+          </a:p>
+          <a:p>
+            <a:pPr marL="285750" indent="-285750">
+              <a:buFont typeface="Arial" panose="020B0604020202020204" pitchFamily="34" charset="0"/>
+              <a:buChar char="•"/>
+            </a:pPr>
+            <a:r>
+              <a:rPr lang="en-US" sz="1700" dirty="0" smtClean="0"/>
+              <a:t>Integration</a:t>
+            </a:r>
+            <a:endParaRPr lang="en-US" sz="1700" dirty="0"/>
+          </a:p>
+          <a:p>
+            <a:pPr marL="285750" indent="-285750">
+              <a:buFont typeface="Arial" panose="020B0604020202020204" pitchFamily="34" charset="0"/>
+              <a:buChar char="•"/>
+            </a:pPr>
+            <a:r>
+              <a:rPr lang="en-US" sz="1700" dirty="0"/>
+              <a:t>Scope</a:t>
+            </a:r>
+          </a:p>
+          <a:p>
+            <a:pPr marL="285750" indent="-285750">
+              <a:buFont typeface="Arial" panose="020B0604020202020204" pitchFamily="34" charset="0"/>
+              <a:buChar char="•"/>
+            </a:pPr>
+            <a:r>
+              <a:rPr lang="en-US" sz="1700" dirty="0"/>
+              <a:t>Time</a:t>
+            </a:r>
+          </a:p>
+          <a:p>
+            <a:pPr marL="285750" indent="-285750">
+              <a:buFont typeface="Arial" panose="020B0604020202020204" pitchFamily="34" charset="0"/>
+              <a:buChar char="•"/>
+            </a:pPr>
+            <a:r>
+              <a:rPr lang="en-US" sz="1700" dirty="0"/>
+              <a:t>Cost</a:t>
+            </a:r>
+          </a:p>
+          <a:p>
+            <a:pPr marL="285750" indent="-285750">
+              <a:buFont typeface="Arial" panose="020B0604020202020204" pitchFamily="34" charset="0"/>
+              <a:buChar char="•"/>
+            </a:pPr>
+            <a:r>
+              <a:rPr lang="en-US" sz="1700" dirty="0"/>
+              <a:t>Quality</a:t>
+            </a:r>
+          </a:p>
+          <a:p>
+            <a:pPr marL="285750" indent="-285750">
+              <a:buFont typeface="Arial" panose="020B0604020202020204" pitchFamily="34" charset="0"/>
+              <a:buChar char="•"/>
+            </a:pPr>
+            <a:r>
+              <a:rPr lang="en-US" sz="1700" dirty="0"/>
+              <a:t>Procurement</a:t>
+            </a:r>
+          </a:p>
+          <a:p>
+            <a:pPr marL="285750" indent="-285750">
+              <a:buFont typeface="Arial" panose="020B0604020202020204" pitchFamily="34" charset="0"/>
+              <a:buChar char="•"/>
+            </a:pPr>
+            <a:r>
+              <a:rPr lang="en-US" sz="1700" dirty="0"/>
+              <a:t>Human resources</a:t>
+            </a:r>
+          </a:p>
+          <a:p>
+            <a:pPr marL="285750" indent="-285750">
+              <a:buFont typeface="Arial" panose="020B0604020202020204" pitchFamily="34" charset="0"/>
+              <a:buChar char="•"/>
+            </a:pPr>
+            <a:r>
+              <a:rPr lang="en-US" sz="1700" dirty="0"/>
+              <a:t>Communications</a:t>
+            </a:r>
+          </a:p>
+          <a:p>
+            <a:pPr marL="285750" indent="-285750">
+              <a:buFont typeface="Arial" panose="020B0604020202020204" pitchFamily="34" charset="0"/>
+              <a:buChar char="•"/>
+            </a:pPr>
+            <a:r>
+              <a:rPr lang="en-US" sz="1700" dirty="0"/>
+              <a:t>Risk management</a:t>
+            </a:r>
+          </a:p>
+          <a:p>
+            <a:pPr marL="285750" indent="-285750">
+              <a:buFont typeface="Arial" panose="020B0604020202020204" pitchFamily="34" charset="0"/>
+              <a:buChar char="•"/>
+            </a:pPr>
+            <a:r>
+              <a:rPr lang="en-US" sz="1700" dirty="0"/>
+              <a:t>Stakeholder management</a:t>
+            </a:r>
+          </a:p>
+          <a:p>
+            <a:endParaRPr lang="en-US" sz="1700" dirty="0">
+              <a:latin typeface="Times New Roman" panose="02020603050405020304" pitchFamily="18" charset="0"/>
+              <a:cs typeface="Times New Roman" panose="02020603050405020304" pitchFamily="18" charset="0"/>
+            </a:endParaRPr>
+          </a:p>
+        </p:txBody>
+      </p:sp>
+      <p:sp>
+        <p:nvSpPr>
+          <p:cNvPr id="3" name="Title 2"/>
+          <p:cNvSpPr>
+            <a:spLocks noGrp="1"/>
+          </p:cNvSpPr>
+          <p:nvPr>
+            <p:ph type="title"/>
+          </p:nvPr>
+        </p:nvSpPr>
+        <p:spPr>
+          <a:xfrm>
+            <a:off x="504000" y="301320"/>
+            <a:ext cx="9071640" cy="526189"/>
+          </a:xfrm>
+        </p:spPr>
+        <p:txBody>
+          <a:bodyPr/>
+          <a:lstStyle/>
+          <a:p>
+            <a:pPr algn="ctr"/>
+            <a:r>
+              <a:rPr lang="en-US" sz="3200" b="1" u="sng" strike="noStrike" spc="-1" dirty="0" smtClean="0">
+                <a:solidFill>
+                  <a:srgbClr val="000099"/>
+                </a:solidFill>
+                <a:uFillTx/>
+                <a:latin typeface="Times New Roman" panose="02020603050405020304" pitchFamily="18" charset="0"/>
+                <a:cs typeface="Times New Roman" panose="02020603050405020304" pitchFamily="18" charset="0"/>
+              </a:rPr>
+              <a:t>Project Management</a:t>
+            </a:r>
+            <a:endParaRPr lang="en-US" sz="3200" dirty="0"/>
+          </a:p>
+        </p:txBody>
+      </p:sp>
+    </p:spTree>
+    <p:extLst>
+      <p:ext uri="{BB962C8B-B14F-4D97-AF65-F5344CB8AC3E}">
+        <p14:creationId xmlns:p14="http://schemas.microsoft.com/office/powerpoint/2010/main" val="3475572101"/>
       </p:ext>
     </p:extLst>
   </p:cSld>

</xml_diff>